<commit_message>
opaque change! git no gut w/ binary
</commit_message>
<xml_diff>
--- a/LTI_GitHub-Training-GLWA-SEMIFLD.pptx
+++ b/LTI_GitHub-Training-GLWA-SEMIFLD.pptx
@@ -300,7 +300,7 @@
       </p15:sldGuideLst>
     </p:ext>
     <p:ext uri="http://customooxmlschemas.google.com/">
-      <go:slidesCustomData xmlns:go="http://customooxmlschemas.google.com/" xmlns:ahyp="http://schemas.microsoft.com/office/drawing/2018/hyperlinkcolor" xmlns:p15="http://schemas.microsoft.com/office/powerpoint/2012/main" xmlns:p14="http://schemas.microsoft.com/office/powerpoint/2010/main" xmlns:com="http://schemas.openxmlformats.org/drawingml/2006/compatibility" xmlns:pvml="urn:schemas-microsoft-com:office:powerpoint" xmlns:v="urn:schemas-microsoft-com:vml" xmlns:o="urn:schemas-microsoft-com:office:office" xmlns:dgm="http://schemas.openxmlformats.org/drawingml/2006/diagram" xmlns:c="http://schemas.openxmlformats.org/drawingml/2006/chart" xmlns:mv="urn:schemas-microsoft-com:mac:vml" xmlns:mc="http://schemas.openxmlformats.org/markup-compatibility/2006" xmlns="" r:id="rId47" roundtripDataSignature="AMtx7mhNjXAhy3Yw9kcx8H8I9YsHj+EsFQ=="/>
+      <go:slidesCustomData xmlns="" xmlns:mc="http://schemas.openxmlformats.org/markup-compatibility/2006" xmlns:mv="urn:schemas-microsoft-com:mac:vml" xmlns:c="http://schemas.openxmlformats.org/drawingml/2006/chart" xmlns:dgm="http://schemas.openxmlformats.org/drawingml/2006/diagram" xmlns:o="urn:schemas-microsoft-com:office:office" xmlns:v="urn:schemas-microsoft-com:vml" xmlns:pvml="urn:schemas-microsoft-com:office:powerpoint" xmlns:com="http://schemas.openxmlformats.org/drawingml/2006/compatibility" xmlns:p14="http://schemas.microsoft.com/office/powerpoint/2010/main" xmlns:p15="http://schemas.microsoft.com/office/powerpoint/2012/main" xmlns:ahyp="http://schemas.microsoft.com/office/drawing/2018/hyperlinkcolor" xmlns:go="http://customooxmlschemas.google.com/" r:id="rId47" roundtripDataSignature="AMtx7mhNjXAhy3Yw9kcx8H8I9YsHj+EsFQ=="/>
     </p:ext>
   </p:extLst>
 </p:presentation>
@@ -16973,7 +16973,7 @@
         <p:fade/>
       </p:transition>
     </mc:Choice>
-    <mc:Fallback xmlns:ahyp="http://schemas.microsoft.com/office/drawing/2018/hyperlinkcolor" xmlns:p15="http://schemas.microsoft.com/office/powerpoint/2012/main" xmlns:com="http://schemas.openxmlformats.org/drawingml/2006/compatibility" xmlns:pvml="urn:schemas-microsoft-com:office:powerpoint" xmlns:v="urn:schemas-microsoft-com:vml" xmlns:o="urn:schemas-microsoft-com:office:office" xmlns:dgm="http://schemas.openxmlformats.org/drawingml/2006/diagram" xmlns:c="http://schemas.openxmlformats.org/drawingml/2006/chart" xmlns:mv="urn:schemas-microsoft-com:mac:vml" xmlns="">
+    <mc:Fallback xmlns="" xmlns:mv="urn:schemas-microsoft-com:mac:vml" xmlns:c="http://schemas.openxmlformats.org/drawingml/2006/chart" xmlns:dgm="http://schemas.openxmlformats.org/drawingml/2006/diagram" xmlns:o="urn:schemas-microsoft-com:office:office" xmlns:v="urn:schemas-microsoft-com:vml" xmlns:pvml="urn:schemas-microsoft-com:office:powerpoint" xmlns:com="http://schemas.openxmlformats.org/drawingml/2006/compatibility" xmlns:p15="http://schemas.microsoft.com/office/powerpoint/2012/main" xmlns:ahyp="http://schemas.microsoft.com/office/drawing/2018/hyperlinkcolor">
       <p:transition spd="slow">
         <p:fade/>
       </p:transition>
@@ -28672,13 +28672,18 @@
               <a:t>Click on </a:t>
             </a:r>
             <a:r>
-              <a:rPr lang="en-US" dirty="0" err="1"/>
+              <a:rPr lang="en-US" dirty="0" err="1">
+                <a:hlinkClick r:id="rId3"/>
+              </a:rPr>
               <a:t>LimnoTech</a:t>
             </a:r>
             <a:r>
-              <a:rPr lang="en-US" dirty="0"/>
+              <a:rPr lang="en-US" dirty="0">
+                <a:hlinkClick r:id="rId3"/>
+              </a:rPr>
               <a:t>/GitHub-Training-SEMIFLD</a:t>
             </a:r>
+            <a:endParaRPr lang="en-US" dirty="0"/>
           </a:p>
           <a:p>
             <a:r>
@@ -29261,7 +29266,7 @@
           <a:p>
             <a:r>
               <a:rPr lang="en-US" dirty="0"/>
-              <a:t>Branch from Master</a:t>
+              <a:t>Branch from Main</a:t>
             </a:r>
           </a:p>
           <a:p>
@@ -33274,7 +33279,7 @@
         <p:fade/>
       </p:transition>
     </mc:Choice>
-    <mc:Fallback xmlns:ahyp="http://schemas.microsoft.com/office/drawing/2018/hyperlinkcolor" xmlns:p15="http://schemas.microsoft.com/office/powerpoint/2012/main" xmlns:com="http://schemas.openxmlformats.org/drawingml/2006/compatibility" xmlns:pvml="urn:schemas-microsoft-com:office:powerpoint" xmlns:v="urn:schemas-microsoft-com:vml" xmlns:o="urn:schemas-microsoft-com:office:office" xmlns:dgm="http://schemas.openxmlformats.org/drawingml/2006/diagram" xmlns:c="http://schemas.openxmlformats.org/drawingml/2006/chart" xmlns:mv="urn:schemas-microsoft-com:mac:vml" xmlns="">
+    <mc:Fallback xmlns="" xmlns:mv="urn:schemas-microsoft-com:mac:vml" xmlns:c="http://schemas.openxmlformats.org/drawingml/2006/chart" xmlns:dgm="http://schemas.openxmlformats.org/drawingml/2006/diagram" xmlns:o="urn:schemas-microsoft-com:office:office" xmlns:v="urn:schemas-microsoft-com:vml" xmlns:pvml="urn:schemas-microsoft-com:office:powerpoint" xmlns:com="http://schemas.openxmlformats.org/drawingml/2006/compatibility" xmlns:p15="http://schemas.microsoft.com/office/powerpoint/2012/main" xmlns:ahyp="http://schemas.microsoft.com/office/drawing/2018/hyperlinkcolor">
       <p:transition spd="slow">
         <p:fade/>
       </p:transition>

</xml_diff>